<commit_message>
adding day 2 files
</commit_message>
<xml_diff>
--- a/powerpoints_2025/crisp_2025_R_day2.pptx
+++ b/powerpoints_2025/crisp_2025_R_day2.pptx
@@ -4,10 +4,16 @@
   <p:sldMasterIdLst>
     <p:sldMasterId id="2147483648" r:id="rId1"/>
   </p:sldMasterIdLst>
+  <p:notesMasterIdLst>
+    <p:notesMasterId r:id="rId8"/>
+  </p:notesMasterIdLst>
   <p:sldIdLst>
     <p:sldId id="256" r:id="rId2"/>
-    <p:sldId id="257" r:id="rId3"/>
-    <p:sldId id="268" r:id="rId4"/>
+    <p:sldId id="269" r:id="rId3"/>
+    <p:sldId id="257" r:id="rId4"/>
+    <p:sldId id="272" r:id="rId5"/>
+    <p:sldId id="270" r:id="rId6"/>
+    <p:sldId id="271" r:id="rId7"/>
   </p:sldIdLst>
   <p:sldSz cx="12192000" cy="6858000"/>
   <p:notesSz cx="6858000" cy="9144000"/>
@@ -114,6 +120,782 @@
 </p:presentation>
 </file>
 
+<file path=ppt/notesMasters/notesMaster1.xml><?xml version="1.0" encoding="utf-8"?>
+<p:notesMaster xmlns:a="http://schemas.openxmlformats.org/drawingml/2006/main" xmlns:r="http://schemas.openxmlformats.org/officeDocument/2006/relationships" xmlns:p="http://schemas.openxmlformats.org/presentationml/2006/main">
+  <p:cSld>
+    <p:bg>
+      <p:bgRef idx="1001">
+        <a:schemeClr val="bg1"/>
+      </p:bgRef>
+    </p:bg>
+    <p:spTree>
+      <p:nvGrpSpPr>
+        <p:cNvPr id="1" name=""/>
+        <p:cNvGrpSpPr/>
+        <p:nvPr/>
+      </p:nvGrpSpPr>
+      <p:grpSpPr>
+        <a:xfrm>
+          <a:off x="0" y="0"/>
+          <a:ext cx="0" cy="0"/>
+          <a:chOff x="0" y="0"/>
+          <a:chExt cx="0" cy="0"/>
+        </a:xfrm>
+      </p:grpSpPr>
+      <p:sp>
+        <p:nvSpPr>
+          <p:cNvPr id="2" name="Header Placeholder 1"/>
+          <p:cNvSpPr>
+            <a:spLocks noGrp="1"/>
+          </p:cNvSpPr>
+          <p:nvPr>
+            <p:ph type="hdr" sz="quarter"/>
+          </p:nvPr>
+        </p:nvSpPr>
+        <p:spPr>
+          <a:xfrm>
+            <a:off x="0" y="0"/>
+            <a:ext cx="2971800" cy="458788"/>
+          </a:xfrm>
+          <a:prstGeom prst="rect">
+            <a:avLst/>
+          </a:prstGeom>
+        </p:spPr>
+        <p:txBody>
+          <a:bodyPr vert="horz" lIns="91440" tIns="45720" rIns="91440" bIns="45720" rtlCol="0"/>
+          <a:lstStyle>
+            <a:lvl1pPr algn="l">
+              <a:defRPr sz="1200"/>
+            </a:lvl1pPr>
+          </a:lstStyle>
+          <a:p>
+            <a:endParaRPr lang="en-US"/>
+          </a:p>
+        </p:txBody>
+      </p:sp>
+      <p:sp>
+        <p:nvSpPr>
+          <p:cNvPr id="3" name="Date Placeholder 2"/>
+          <p:cNvSpPr>
+            <a:spLocks noGrp="1"/>
+          </p:cNvSpPr>
+          <p:nvPr>
+            <p:ph type="dt" idx="1"/>
+          </p:nvPr>
+        </p:nvSpPr>
+        <p:spPr>
+          <a:xfrm>
+            <a:off x="3884613" y="0"/>
+            <a:ext cx="2971800" cy="458788"/>
+          </a:xfrm>
+          <a:prstGeom prst="rect">
+            <a:avLst/>
+          </a:prstGeom>
+        </p:spPr>
+        <p:txBody>
+          <a:bodyPr vert="horz" lIns="91440" tIns="45720" rIns="91440" bIns="45720" rtlCol="0"/>
+          <a:lstStyle>
+            <a:lvl1pPr algn="r">
+              <a:defRPr sz="1200"/>
+            </a:lvl1pPr>
+          </a:lstStyle>
+          <a:p>
+            <a:fld id="{F9C8C89B-37FB-6044-B7FE-ED1648408672}" type="datetimeFigureOut">
+              <a:rPr lang="en-US" smtClean="0"/>
+              <a:t>7/8/25</a:t>
+            </a:fld>
+            <a:endParaRPr lang="en-US"/>
+          </a:p>
+        </p:txBody>
+      </p:sp>
+      <p:sp>
+        <p:nvSpPr>
+          <p:cNvPr id="4" name="Slide Image Placeholder 3"/>
+          <p:cNvSpPr>
+            <a:spLocks noGrp="1" noRot="1" noChangeAspect="1"/>
+          </p:cNvSpPr>
+          <p:nvPr>
+            <p:ph type="sldImg" idx="2"/>
+          </p:nvPr>
+        </p:nvSpPr>
+        <p:spPr>
+          <a:xfrm>
+            <a:off x="685800" y="1143000"/>
+            <a:ext cx="5486400" cy="3086100"/>
+          </a:xfrm>
+          <a:prstGeom prst="rect">
+            <a:avLst/>
+          </a:prstGeom>
+          <a:noFill/>
+          <a:ln w="12700">
+            <a:solidFill>
+              <a:prstClr val="black"/>
+            </a:solidFill>
+          </a:ln>
+        </p:spPr>
+        <p:txBody>
+          <a:bodyPr vert="horz" lIns="91440" tIns="45720" rIns="91440" bIns="45720" rtlCol="0" anchor="ctr"/>
+          <a:lstStyle/>
+          <a:p>
+            <a:endParaRPr lang="en-US"/>
+          </a:p>
+        </p:txBody>
+      </p:sp>
+      <p:sp>
+        <p:nvSpPr>
+          <p:cNvPr id="5" name="Notes Placeholder 4"/>
+          <p:cNvSpPr>
+            <a:spLocks noGrp="1"/>
+          </p:cNvSpPr>
+          <p:nvPr>
+            <p:ph type="body" sz="quarter" idx="3"/>
+          </p:nvPr>
+        </p:nvSpPr>
+        <p:spPr>
+          <a:xfrm>
+            <a:off x="685800" y="4400550"/>
+            <a:ext cx="5486400" cy="3600450"/>
+          </a:xfrm>
+          <a:prstGeom prst="rect">
+            <a:avLst/>
+          </a:prstGeom>
+        </p:spPr>
+        <p:txBody>
+          <a:bodyPr vert="horz" lIns="91440" tIns="45720" rIns="91440" bIns="45720" rtlCol="0"/>
+          <a:lstStyle/>
+          <a:p>
+            <a:pPr lvl="0"/>
+            <a:r>
+              <a:rPr lang="en-US"/>
+              <a:t>Click to edit Master text styles</a:t>
+            </a:r>
+          </a:p>
+          <a:p>
+            <a:pPr lvl="1"/>
+            <a:r>
+              <a:rPr lang="en-US"/>
+              <a:t>Second level</a:t>
+            </a:r>
+          </a:p>
+          <a:p>
+            <a:pPr lvl="2"/>
+            <a:r>
+              <a:rPr lang="en-US"/>
+              <a:t>Third level</a:t>
+            </a:r>
+          </a:p>
+          <a:p>
+            <a:pPr lvl="3"/>
+            <a:r>
+              <a:rPr lang="en-US"/>
+              <a:t>Fourth level</a:t>
+            </a:r>
+          </a:p>
+          <a:p>
+            <a:pPr lvl="4"/>
+            <a:r>
+              <a:rPr lang="en-US"/>
+              <a:t>Fifth level</a:t>
+            </a:r>
+          </a:p>
+        </p:txBody>
+      </p:sp>
+      <p:sp>
+        <p:nvSpPr>
+          <p:cNvPr id="6" name="Footer Placeholder 5"/>
+          <p:cNvSpPr>
+            <a:spLocks noGrp="1"/>
+          </p:cNvSpPr>
+          <p:nvPr>
+            <p:ph type="ftr" sz="quarter" idx="4"/>
+          </p:nvPr>
+        </p:nvSpPr>
+        <p:spPr>
+          <a:xfrm>
+            <a:off x="0" y="8685213"/>
+            <a:ext cx="2971800" cy="458787"/>
+          </a:xfrm>
+          <a:prstGeom prst="rect">
+            <a:avLst/>
+          </a:prstGeom>
+        </p:spPr>
+        <p:txBody>
+          <a:bodyPr vert="horz" lIns="91440" tIns="45720" rIns="91440" bIns="45720" rtlCol="0" anchor="b"/>
+          <a:lstStyle>
+            <a:lvl1pPr algn="l">
+              <a:defRPr sz="1200"/>
+            </a:lvl1pPr>
+          </a:lstStyle>
+          <a:p>
+            <a:endParaRPr lang="en-US"/>
+          </a:p>
+        </p:txBody>
+      </p:sp>
+      <p:sp>
+        <p:nvSpPr>
+          <p:cNvPr id="7" name="Slide Number Placeholder 6"/>
+          <p:cNvSpPr>
+            <a:spLocks noGrp="1"/>
+          </p:cNvSpPr>
+          <p:nvPr>
+            <p:ph type="sldNum" sz="quarter" idx="5"/>
+          </p:nvPr>
+        </p:nvSpPr>
+        <p:spPr>
+          <a:xfrm>
+            <a:off x="3884613" y="8685213"/>
+            <a:ext cx="2971800" cy="458787"/>
+          </a:xfrm>
+          <a:prstGeom prst="rect">
+            <a:avLst/>
+          </a:prstGeom>
+        </p:spPr>
+        <p:txBody>
+          <a:bodyPr vert="horz" lIns="91440" tIns="45720" rIns="91440" bIns="45720" rtlCol="0" anchor="b"/>
+          <a:lstStyle>
+            <a:lvl1pPr algn="r">
+              <a:defRPr sz="1200"/>
+            </a:lvl1pPr>
+          </a:lstStyle>
+          <a:p>
+            <a:fld id="{AA204E14-BC01-2144-B361-12211DA8646D}" type="slidenum">
+              <a:rPr lang="en-US" smtClean="0"/>
+              <a:t>‹#›</a:t>
+            </a:fld>
+            <a:endParaRPr lang="en-US"/>
+          </a:p>
+        </p:txBody>
+      </p:sp>
+    </p:spTree>
+    <p:extLst>
+      <p:ext uri="{BB962C8B-B14F-4D97-AF65-F5344CB8AC3E}">
+        <p14:creationId xmlns:p14="http://schemas.microsoft.com/office/powerpoint/2010/main" val="492866792"/>
+      </p:ext>
+    </p:extLst>
+  </p:cSld>
+  <p:clrMap bg1="lt1" tx1="dk1" bg2="lt2" tx2="dk2" accent1="accent1" accent2="accent2" accent3="accent3" accent4="accent4" accent5="accent5" accent6="accent6" hlink="hlink" folHlink="folHlink"/>
+  <p:notesStyle>
+    <a:lvl1pPr marL="0" algn="l" defTabSz="914400" rtl="0" eaLnBrk="1" latinLnBrk="0" hangingPunct="1">
+      <a:defRPr sz="1200" kern="1200">
+        <a:solidFill>
+          <a:schemeClr val="tx1"/>
+        </a:solidFill>
+        <a:latin typeface="+mn-lt"/>
+        <a:ea typeface="+mn-ea"/>
+        <a:cs typeface="+mn-cs"/>
+      </a:defRPr>
+    </a:lvl1pPr>
+    <a:lvl2pPr marL="457200" algn="l" defTabSz="914400" rtl="0" eaLnBrk="1" latinLnBrk="0" hangingPunct="1">
+      <a:defRPr sz="1200" kern="1200">
+        <a:solidFill>
+          <a:schemeClr val="tx1"/>
+        </a:solidFill>
+        <a:latin typeface="+mn-lt"/>
+        <a:ea typeface="+mn-ea"/>
+        <a:cs typeface="+mn-cs"/>
+      </a:defRPr>
+    </a:lvl2pPr>
+    <a:lvl3pPr marL="914400" algn="l" defTabSz="914400" rtl="0" eaLnBrk="1" latinLnBrk="0" hangingPunct="1">
+      <a:defRPr sz="1200" kern="1200">
+        <a:solidFill>
+          <a:schemeClr val="tx1"/>
+        </a:solidFill>
+        <a:latin typeface="+mn-lt"/>
+        <a:ea typeface="+mn-ea"/>
+        <a:cs typeface="+mn-cs"/>
+      </a:defRPr>
+    </a:lvl3pPr>
+    <a:lvl4pPr marL="1371600" algn="l" defTabSz="914400" rtl="0" eaLnBrk="1" latinLnBrk="0" hangingPunct="1">
+      <a:defRPr sz="1200" kern="1200">
+        <a:solidFill>
+          <a:schemeClr val="tx1"/>
+        </a:solidFill>
+        <a:latin typeface="+mn-lt"/>
+        <a:ea typeface="+mn-ea"/>
+        <a:cs typeface="+mn-cs"/>
+      </a:defRPr>
+    </a:lvl4pPr>
+    <a:lvl5pPr marL="1828800" algn="l" defTabSz="914400" rtl="0" eaLnBrk="1" latinLnBrk="0" hangingPunct="1">
+      <a:defRPr sz="1200" kern="1200">
+        <a:solidFill>
+          <a:schemeClr val="tx1"/>
+        </a:solidFill>
+        <a:latin typeface="+mn-lt"/>
+        <a:ea typeface="+mn-ea"/>
+        <a:cs typeface="+mn-cs"/>
+      </a:defRPr>
+    </a:lvl5pPr>
+    <a:lvl6pPr marL="2286000" algn="l" defTabSz="914400" rtl="0" eaLnBrk="1" latinLnBrk="0" hangingPunct="1">
+      <a:defRPr sz="1200" kern="1200">
+        <a:solidFill>
+          <a:schemeClr val="tx1"/>
+        </a:solidFill>
+        <a:latin typeface="+mn-lt"/>
+        <a:ea typeface="+mn-ea"/>
+        <a:cs typeface="+mn-cs"/>
+      </a:defRPr>
+    </a:lvl6pPr>
+    <a:lvl7pPr marL="2743200" algn="l" defTabSz="914400" rtl="0" eaLnBrk="1" latinLnBrk="0" hangingPunct="1">
+      <a:defRPr sz="1200" kern="1200">
+        <a:solidFill>
+          <a:schemeClr val="tx1"/>
+        </a:solidFill>
+        <a:latin typeface="+mn-lt"/>
+        <a:ea typeface="+mn-ea"/>
+        <a:cs typeface="+mn-cs"/>
+      </a:defRPr>
+    </a:lvl7pPr>
+    <a:lvl8pPr marL="3200400" algn="l" defTabSz="914400" rtl="0" eaLnBrk="1" latinLnBrk="0" hangingPunct="1">
+      <a:defRPr sz="1200" kern="1200">
+        <a:solidFill>
+          <a:schemeClr val="tx1"/>
+        </a:solidFill>
+        <a:latin typeface="+mn-lt"/>
+        <a:ea typeface="+mn-ea"/>
+        <a:cs typeface="+mn-cs"/>
+      </a:defRPr>
+    </a:lvl8pPr>
+    <a:lvl9pPr marL="3657600" algn="l" defTabSz="914400" rtl="0" eaLnBrk="1" latinLnBrk="0" hangingPunct="1">
+      <a:defRPr sz="1200" kern="1200">
+        <a:solidFill>
+          <a:schemeClr val="tx1"/>
+        </a:solidFill>
+        <a:latin typeface="+mn-lt"/>
+        <a:ea typeface="+mn-ea"/>
+        <a:cs typeface="+mn-cs"/>
+      </a:defRPr>
+    </a:lvl9pPr>
+  </p:notesStyle>
+</p:notesMaster>
+</file>
+
+<file path=ppt/notesSlides/notesSlide1.xml><?xml version="1.0" encoding="utf-8"?>
+<p:notes xmlns:a="http://schemas.openxmlformats.org/drawingml/2006/main" xmlns:r="http://schemas.openxmlformats.org/officeDocument/2006/relationships" xmlns:p="http://schemas.openxmlformats.org/presentationml/2006/main">
+  <p:cSld>
+    <p:spTree>
+      <p:nvGrpSpPr>
+        <p:cNvPr id="1" name=""/>
+        <p:cNvGrpSpPr/>
+        <p:nvPr/>
+      </p:nvGrpSpPr>
+      <p:grpSpPr>
+        <a:xfrm>
+          <a:off x="0" y="0"/>
+          <a:ext cx="0" cy="0"/>
+          <a:chOff x="0" y="0"/>
+          <a:chExt cx="0" cy="0"/>
+        </a:xfrm>
+      </p:grpSpPr>
+      <p:sp>
+        <p:nvSpPr>
+          <p:cNvPr id="2" name="Slide Image Placeholder 1"/>
+          <p:cNvSpPr>
+            <a:spLocks noGrp="1" noRot="1" noChangeAspect="1"/>
+          </p:cNvSpPr>
+          <p:nvPr>
+            <p:ph type="sldImg"/>
+          </p:nvPr>
+        </p:nvSpPr>
+        <p:spPr/>
+      </p:sp>
+      <p:sp>
+        <p:nvSpPr>
+          <p:cNvPr id="3" name="Notes Placeholder 2"/>
+          <p:cNvSpPr>
+            <a:spLocks noGrp="1"/>
+          </p:cNvSpPr>
+          <p:nvPr>
+            <p:ph type="body" idx="1"/>
+          </p:nvPr>
+        </p:nvSpPr>
+        <p:spPr/>
+        <p:txBody>
+          <a:bodyPr/>
+          <a:lstStyle/>
+          <a:p>
+            <a:endParaRPr lang="en-US" dirty="0"/>
+          </a:p>
+        </p:txBody>
+      </p:sp>
+      <p:sp>
+        <p:nvSpPr>
+          <p:cNvPr id="4" name="Slide Number Placeholder 3"/>
+          <p:cNvSpPr>
+            <a:spLocks noGrp="1"/>
+          </p:cNvSpPr>
+          <p:nvPr>
+            <p:ph type="sldNum" sz="quarter" idx="5"/>
+          </p:nvPr>
+        </p:nvSpPr>
+        <p:spPr/>
+        <p:txBody>
+          <a:bodyPr/>
+          <a:lstStyle/>
+          <a:p>
+            <a:fld id="{AA204E14-BC01-2144-B361-12211DA8646D}" type="slidenum">
+              <a:rPr lang="en-US" smtClean="0"/>
+              <a:t>3</a:t>
+            </a:fld>
+            <a:endParaRPr lang="en-US"/>
+          </a:p>
+        </p:txBody>
+      </p:sp>
+    </p:spTree>
+    <p:extLst>
+      <p:ext uri="{BB962C8B-B14F-4D97-AF65-F5344CB8AC3E}">
+        <p14:creationId xmlns:p14="http://schemas.microsoft.com/office/powerpoint/2010/main" val="3838104809"/>
+      </p:ext>
+    </p:extLst>
+  </p:cSld>
+  <p:clrMapOvr>
+    <a:masterClrMapping/>
+  </p:clrMapOvr>
+</p:notes>
+</file>
+
+<file path=ppt/notesSlides/notesSlide2.xml><?xml version="1.0" encoding="utf-8"?>
+<p:notes xmlns:a="http://schemas.openxmlformats.org/drawingml/2006/main" xmlns:r="http://schemas.openxmlformats.org/officeDocument/2006/relationships" xmlns:p="http://schemas.openxmlformats.org/presentationml/2006/main">
+  <p:cSld>
+    <p:spTree>
+      <p:nvGrpSpPr>
+        <p:cNvPr id="1" name=""/>
+        <p:cNvGrpSpPr/>
+        <p:nvPr/>
+      </p:nvGrpSpPr>
+      <p:grpSpPr>
+        <a:xfrm>
+          <a:off x="0" y="0"/>
+          <a:ext cx="0" cy="0"/>
+          <a:chOff x="0" y="0"/>
+          <a:chExt cx="0" cy="0"/>
+        </a:xfrm>
+      </p:grpSpPr>
+      <p:sp>
+        <p:nvSpPr>
+          <p:cNvPr id="2" name="Slide Image Placeholder 1"/>
+          <p:cNvSpPr>
+            <a:spLocks noGrp="1" noRot="1" noChangeAspect="1"/>
+          </p:cNvSpPr>
+          <p:nvPr>
+            <p:ph type="sldImg"/>
+          </p:nvPr>
+        </p:nvSpPr>
+        <p:spPr/>
+      </p:sp>
+      <p:sp>
+        <p:nvSpPr>
+          <p:cNvPr id="3" name="Notes Placeholder 2"/>
+          <p:cNvSpPr>
+            <a:spLocks noGrp="1"/>
+          </p:cNvSpPr>
+          <p:nvPr>
+            <p:ph type="body" idx="1"/>
+          </p:nvPr>
+        </p:nvSpPr>
+        <p:spPr/>
+        <p:txBody>
+          <a:bodyPr/>
+          <a:lstStyle/>
+          <a:p>
+            <a:r>
+              <a:rPr lang="en-US" dirty="0"/>
+              <a:t>Expressions: 5+10</a:t>
+            </a:r>
+          </a:p>
+          <a:p>
+            <a:endParaRPr lang="en-US" dirty="0"/>
+          </a:p>
+          <a:p>
+            <a:r>
+              <a:rPr lang="en-US" dirty="0"/>
+              <a:t>Variables: Choose a variable name, try to make it descriptive. Assign variable with = or &lt;-. If you assign a variable in R, it doesn’t print the variable. </a:t>
+            </a:r>
+          </a:p>
+          <a:p>
+            <a:endParaRPr lang="en-US" dirty="0"/>
+          </a:p>
+          <a:p>
+            <a:r>
+              <a:rPr lang="en-US" dirty="0"/>
+              <a:t>a &lt;- 1 + 2</a:t>
+            </a:r>
+          </a:p>
+          <a:p>
+            <a:r>
+              <a:rPr lang="en-US" dirty="0"/>
+              <a:t>b &lt;- 5 + 5</a:t>
+            </a:r>
+          </a:p>
+          <a:p>
+            <a:endParaRPr lang="en-US" dirty="0"/>
+          </a:p>
+          <a:p>
+            <a:r>
+              <a:rPr lang="en-US" dirty="0"/>
+              <a:t>Vector: Use the c(1,2,3,4) notation. Not 1,2,3,4! This will cause an error. Need to put c() around it. </a:t>
+            </a:r>
+          </a:p>
+          <a:p>
+            <a:endParaRPr lang="en-US" dirty="0"/>
+          </a:p>
+          <a:p>
+            <a:pPr marL="0" marR="0" lvl="0" indent="0" algn="l" defTabSz="914400" rtl="0" eaLnBrk="1" fontAlgn="auto" latinLnBrk="0" hangingPunct="1">
+              <a:lnSpc>
+                <a:spcPct val="100000"/>
+              </a:lnSpc>
+              <a:spcBef>
+                <a:spcPts val="0"/>
+              </a:spcBef>
+              <a:spcAft>
+                <a:spcPts val="0"/>
+              </a:spcAft>
+              <a:buClrTx/>
+              <a:buSzTx/>
+              <a:buFontTx/>
+              <a:buNone/>
+              <a:tabLst/>
+              <a:defRPr/>
+            </a:pPr>
+            <a:r>
+              <a:rPr lang="en-US" dirty="0"/>
+              <a:t>Loops: </a:t>
+            </a:r>
+          </a:p>
+          <a:p>
+            <a:pPr marL="0" marR="0" lvl="0" indent="0" algn="l" defTabSz="914400" rtl="0" eaLnBrk="1" fontAlgn="auto" latinLnBrk="0" hangingPunct="1">
+              <a:lnSpc>
+                <a:spcPct val="100000"/>
+              </a:lnSpc>
+              <a:spcBef>
+                <a:spcPts val="0"/>
+              </a:spcBef>
+              <a:spcAft>
+                <a:spcPts val="0"/>
+              </a:spcAft>
+              <a:buClrTx/>
+              <a:buSzTx/>
+              <a:buFontTx/>
+              <a:buNone/>
+              <a:tabLst/>
+              <a:defRPr/>
+            </a:pPr>
+            <a:endParaRPr lang="en-US" dirty="0"/>
+          </a:p>
+          <a:p>
+            <a:pPr marL="0" marR="0" lvl="0" indent="0" algn="l" defTabSz="914400" rtl="0" eaLnBrk="1" fontAlgn="auto" latinLnBrk="0" hangingPunct="1">
+              <a:lnSpc>
+                <a:spcPct val="100000"/>
+              </a:lnSpc>
+              <a:spcBef>
+                <a:spcPts val="0"/>
+              </a:spcBef>
+              <a:spcAft>
+                <a:spcPts val="0"/>
+              </a:spcAft>
+              <a:buClrTx/>
+              <a:buSzTx/>
+              <a:buFontTx/>
+              <a:buNone/>
+              <a:tabLst/>
+              <a:defRPr/>
+            </a:pPr>
+            <a:r>
+              <a:rPr lang="en-US" dirty="0"/>
+              <a:t>for (num in c(1,2,3,4)){</a:t>
+            </a:r>
+          </a:p>
+          <a:p>
+            <a:pPr marL="0" marR="0" lvl="0" indent="0" algn="l" defTabSz="914400" rtl="0" eaLnBrk="1" fontAlgn="auto" latinLnBrk="0" hangingPunct="1">
+              <a:lnSpc>
+                <a:spcPct val="100000"/>
+              </a:lnSpc>
+              <a:spcBef>
+                <a:spcPts val="0"/>
+              </a:spcBef>
+              <a:spcAft>
+                <a:spcPts val="0"/>
+              </a:spcAft>
+              <a:buClrTx/>
+              <a:buSzTx/>
+              <a:buFontTx/>
+              <a:buNone/>
+              <a:tabLst/>
+              <a:defRPr/>
+            </a:pPr>
+            <a:endParaRPr lang="en-US" dirty="0"/>
+          </a:p>
+          <a:p>
+            <a:pPr marL="0" marR="0" lvl="0" indent="0" algn="l" defTabSz="914400" rtl="0" eaLnBrk="1" fontAlgn="auto" latinLnBrk="0" hangingPunct="1">
+              <a:lnSpc>
+                <a:spcPct val="100000"/>
+              </a:lnSpc>
+              <a:spcBef>
+                <a:spcPts val="0"/>
+              </a:spcBef>
+              <a:spcAft>
+                <a:spcPts val="0"/>
+              </a:spcAft>
+              <a:buClrTx/>
+              <a:buSzTx/>
+              <a:buFontTx/>
+              <a:buNone/>
+              <a:tabLst/>
+              <a:defRPr/>
+            </a:pPr>
+            <a:r>
+              <a:rPr lang="en-US" dirty="0"/>
+              <a:t>}</a:t>
+            </a:r>
+          </a:p>
+          <a:p>
+            <a:endParaRPr lang="en-US" dirty="0"/>
+          </a:p>
+          <a:p>
+            <a:r>
+              <a:rPr lang="en-US" dirty="0"/>
+              <a:t>Functions: Looks like </a:t>
+            </a:r>
+            <a:r>
+              <a:rPr lang="en-US" dirty="0" err="1"/>
+              <a:t>function_name</a:t>
+            </a:r>
+            <a:r>
+              <a:rPr lang="en-US" dirty="0"/>
+              <a:t>(arguments). Can look up notation to see order of arguments. Named arguments. </a:t>
+            </a:r>
+          </a:p>
+          <a:p>
+            <a:endParaRPr lang="en-US" dirty="0"/>
+          </a:p>
+          <a:p>
+            <a:pPr marL="0" marR="0" lvl="0" indent="0" algn="l" defTabSz="914400" rtl="0" eaLnBrk="1" fontAlgn="auto" latinLnBrk="0" hangingPunct="1">
+              <a:lnSpc>
+                <a:spcPct val="100000"/>
+              </a:lnSpc>
+              <a:spcBef>
+                <a:spcPts val="0"/>
+              </a:spcBef>
+              <a:spcAft>
+                <a:spcPts val="0"/>
+              </a:spcAft>
+              <a:buClrTx/>
+              <a:buSzTx/>
+              <a:buFontTx/>
+              <a:buNone/>
+              <a:tabLst/>
+              <a:defRPr/>
+            </a:pPr>
+            <a:r>
+              <a:rPr lang="en-US" dirty="0"/>
+              <a:t>Give a few example functions, look them up </a:t>
+            </a:r>
+          </a:p>
+          <a:p>
+            <a:endParaRPr lang="en-US" dirty="0"/>
+          </a:p>
+          <a:p>
+            <a:r>
+              <a:rPr lang="en-US" dirty="0"/>
+              <a:t>Writing your own function </a:t>
+            </a:r>
+          </a:p>
+          <a:p>
+            <a:endParaRPr lang="en-US" dirty="0"/>
+          </a:p>
+          <a:p>
+            <a:r>
+              <a:rPr lang="en-US" dirty="0" err="1"/>
+              <a:t>add_two_numbers</a:t>
+            </a:r>
+            <a:r>
+              <a:rPr lang="en-US" dirty="0"/>
+              <a:t> &lt;- function(num1, num2){ </a:t>
+            </a:r>
+          </a:p>
+          <a:p>
+            <a:endParaRPr lang="en-US" dirty="0"/>
+          </a:p>
+          <a:p>
+            <a:r>
+              <a:rPr lang="en-US" dirty="0"/>
+              <a:t>   </a:t>
+            </a:r>
+            <a:r>
+              <a:rPr lang="en-US" dirty="0" err="1"/>
+              <a:t>sum_two_num</a:t>
+            </a:r>
+            <a:r>
+              <a:rPr lang="en-US" dirty="0"/>
+              <a:t> &lt;- num1 + num2</a:t>
+            </a:r>
+          </a:p>
+          <a:p>
+            <a:r>
+              <a:rPr lang="en-US" dirty="0"/>
+              <a:t>   return(</a:t>
+            </a:r>
+            <a:r>
+              <a:rPr lang="en-US" dirty="0" err="1"/>
+              <a:t>sum_two_num</a:t>
+            </a:r>
+            <a:r>
+              <a:rPr lang="en-US" dirty="0"/>
+              <a:t>) </a:t>
+            </a:r>
+          </a:p>
+          <a:p>
+            <a:endParaRPr lang="en-US" dirty="0"/>
+          </a:p>
+          <a:p>
+            <a:r>
+              <a:rPr lang="en-US" dirty="0"/>
+              <a:t>}</a:t>
+            </a:r>
+          </a:p>
+          <a:p>
+            <a:endParaRPr lang="en-US" dirty="0"/>
+          </a:p>
+          <a:p>
+            <a:endParaRPr lang="en-US" dirty="0"/>
+          </a:p>
+        </p:txBody>
+      </p:sp>
+      <p:sp>
+        <p:nvSpPr>
+          <p:cNvPr id="4" name="Slide Number Placeholder 3"/>
+          <p:cNvSpPr>
+            <a:spLocks noGrp="1"/>
+          </p:cNvSpPr>
+          <p:nvPr>
+            <p:ph type="sldNum" sz="quarter" idx="5"/>
+          </p:nvPr>
+        </p:nvSpPr>
+        <p:spPr/>
+        <p:txBody>
+          <a:bodyPr/>
+          <a:lstStyle/>
+          <a:p>
+            <a:fld id="{AA204E14-BC01-2144-B361-12211DA8646D}" type="slidenum">
+              <a:rPr lang="en-US" smtClean="0"/>
+              <a:t>5</a:t>
+            </a:fld>
+            <a:endParaRPr lang="en-US"/>
+          </a:p>
+        </p:txBody>
+      </p:sp>
+    </p:spTree>
+    <p:extLst>
+      <p:ext uri="{BB962C8B-B14F-4D97-AF65-F5344CB8AC3E}">
+        <p14:creationId xmlns:p14="http://schemas.microsoft.com/office/powerpoint/2010/main" val="1471254713"/>
+      </p:ext>
+    </p:extLst>
+  </p:cSld>
+  <p:clrMapOvr>
+    <a:masterClrMapping/>
+  </p:clrMapOvr>
+</p:notes>
+</file>
+
 <file path=ppt/slideLayouts/slideLayout1.xml><?xml version="1.0" encoding="utf-8"?>
 <p:sldLayout xmlns:a="http://schemas.openxmlformats.org/drawingml/2006/main" xmlns:r="http://schemas.openxmlformats.org/officeDocument/2006/relationships" xmlns:p="http://schemas.openxmlformats.org/presentationml/2006/main" type="title" preserve="1">
   <p:cSld name="Title Slide">
@@ -261,7 +1043,7 @@
           <a:p>
             <a:fld id="{5D871124-1A9B-3D47-8EA4-BB13BEDD95F8}" type="datetimeFigureOut">
               <a:rPr lang="en-US" smtClean="0"/>
-              <a:t>7/4/25</a:t>
+              <a:t>7/8/25</a:t>
             </a:fld>
             <a:endParaRPr lang="en-US"/>
           </a:p>
@@ -459,7 +1241,7 @@
           <a:p>
             <a:fld id="{5D871124-1A9B-3D47-8EA4-BB13BEDD95F8}" type="datetimeFigureOut">
               <a:rPr lang="en-US" smtClean="0"/>
-              <a:t>7/4/25</a:t>
+              <a:t>7/8/25</a:t>
             </a:fld>
             <a:endParaRPr lang="en-US"/>
           </a:p>
@@ -667,7 +1449,7 @@
           <a:p>
             <a:fld id="{5D871124-1A9B-3D47-8EA4-BB13BEDD95F8}" type="datetimeFigureOut">
               <a:rPr lang="en-US" smtClean="0"/>
-              <a:t>7/4/25</a:t>
+              <a:t>7/8/25</a:t>
             </a:fld>
             <a:endParaRPr lang="en-US"/>
           </a:p>
@@ -865,7 +1647,7 @@
           <a:p>
             <a:fld id="{5D871124-1A9B-3D47-8EA4-BB13BEDD95F8}" type="datetimeFigureOut">
               <a:rPr lang="en-US" smtClean="0"/>
-              <a:t>7/4/25</a:t>
+              <a:t>7/8/25</a:t>
             </a:fld>
             <a:endParaRPr lang="en-US"/>
           </a:p>
@@ -1140,7 +1922,7 @@
           <a:p>
             <a:fld id="{5D871124-1A9B-3D47-8EA4-BB13BEDD95F8}" type="datetimeFigureOut">
               <a:rPr lang="en-US" smtClean="0"/>
-              <a:t>7/4/25</a:t>
+              <a:t>7/8/25</a:t>
             </a:fld>
             <a:endParaRPr lang="en-US"/>
           </a:p>
@@ -1405,7 +2187,7 @@
           <a:p>
             <a:fld id="{5D871124-1A9B-3D47-8EA4-BB13BEDD95F8}" type="datetimeFigureOut">
               <a:rPr lang="en-US" smtClean="0"/>
-              <a:t>7/4/25</a:t>
+              <a:t>7/8/25</a:t>
             </a:fld>
             <a:endParaRPr lang="en-US"/>
           </a:p>
@@ -1817,7 +2599,7 @@
           <a:p>
             <a:fld id="{5D871124-1A9B-3D47-8EA4-BB13BEDD95F8}" type="datetimeFigureOut">
               <a:rPr lang="en-US" smtClean="0"/>
-              <a:t>7/4/25</a:t>
+              <a:t>7/8/25</a:t>
             </a:fld>
             <a:endParaRPr lang="en-US"/>
           </a:p>
@@ -1958,7 +2740,7 @@
           <a:p>
             <a:fld id="{5D871124-1A9B-3D47-8EA4-BB13BEDD95F8}" type="datetimeFigureOut">
               <a:rPr lang="en-US" smtClean="0"/>
-              <a:t>7/4/25</a:t>
+              <a:t>7/8/25</a:t>
             </a:fld>
             <a:endParaRPr lang="en-US"/>
           </a:p>
@@ -2071,7 +2853,7 @@
           <a:p>
             <a:fld id="{5D871124-1A9B-3D47-8EA4-BB13BEDD95F8}" type="datetimeFigureOut">
               <a:rPr lang="en-US" smtClean="0"/>
-              <a:t>7/4/25</a:t>
+              <a:t>7/8/25</a:t>
             </a:fld>
             <a:endParaRPr lang="en-US"/>
           </a:p>
@@ -2382,7 +3164,7 @@
           <a:p>
             <a:fld id="{5D871124-1A9B-3D47-8EA4-BB13BEDD95F8}" type="datetimeFigureOut">
               <a:rPr lang="en-US" smtClean="0"/>
-              <a:t>7/4/25</a:t>
+              <a:t>7/8/25</a:t>
             </a:fld>
             <a:endParaRPr lang="en-US"/>
           </a:p>
@@ -2670,7 +3452,7 @@
           <a:p>
             <a:fld id="{5D871124-1A9B-3D47-8EA4-BB13BEDD95F8}" type="datetimeFigureOut">
               <a:rPr lang="en-US" smtClean="0"/>
-              <a:t>7/4/25</a:t>
+              <a:t>7/8/25</a:t>
             </a:fld>
             <a:endParaRPr lang="en-US"/>
           </a:p>
@@ -2911,7 +3693,7 @@
           <a:p>
             <a:fld id="{5D871124-1A9B-3D47-8EA4-BB13BEDD95F8}" type="datetimeFigureOut">
               <a:rPr lang="en-US" smtClean="0"/>
-              <a:t>7/4/25</a:t>
+              <a:t>7/8/25</a:t>
             </a:fld>
             <a:endParaRPr lang="en-US"/>
           </a:p>
@@ -3353,7 +4135,7 @@
           <a:p>
             <a:r>
               <a:rPr lang="en-US" dirty="0"/>
-              <a:t>Basic R syntax</a:t>
+              <a:t>R syntax</a:t>
             </a:r>
           </a:p>
         </p:txBody>
@@ -3427,7 +4209,7 @@
           <p:cNvPr id="2" name="Title 1">
             <a:extLst>
               <a:ext uri="{FF2B5EF4-FFF2-40B4-BE49-F238E27FC236}">
-                <a16:creationId xmlns:a16="http://schemas.microsoft.com/office/drawing/2014/main" id="{7C043B37-EB9A-894D-A8B2-D53998092A4A}"/>
+                <a16:creationId xmlns:a16="http://schemas.microsoft.com/office/drawing/2014/main" id="{EEAECAA1-9634-7140-8CB2-A8F1C7F94AA3}"/>
               </a:ext>
             </a:extLst>
           </p:cNvPr>
@@ -3445,7 +4227,7 @@
           <a:p>
             <a:r>
               <a:rPr lang="en-US" dirty="0"/>
-              <a:t>Agenda </a:t>
+              <a:t>Review from last time </a:t>
             </a:r>
           </a:p>
         </p:txBody>
@@ -3455,7 +4237,7 @@
           <p:cNvPr id="3" name="Content Placeholder 2">
             <a:extLst>
               <a:ext uri="{FF2B5EF4-FFF2-40B4-BE49-F238E27FC236}">
-                <a16:creationId xmlns:a16="http://schemas.microsoft.com/office/drawing/2014/main" id="{FA85A48F-9549-3440-9F03-9696FDA420AB}"/>
+                <a16:creationId xmlns:a16="http://schemas.microsoft.com/office/drawing/2014/main" id="{657AC746-82FF-8D4E-BE02-BF70C759FBE4}"/>
               </a:ext>
             </a:extLst>
           </p:cNvPr>
@@ -3466,91 +4248,194 @@
             <p:ph idx="1"/>
           </p:nvPr>
         </p:nvSpPr>
-        <p:spPr/>
-        <p:txBody>
-          <a:bodyPr/>
-          <a:lstStyle/>
-          <a:p>
-            <a:r>
-              <a:rPr lang="en-US" dirty="0"/>
-              <a:t>Learn about basic objects in R</a:t>
+        <p:spPr>
+          <a:xfrm>
+            <a:off x="838199" y="1825625"/>
+            <a:ext cx="6148389" cy="4351338"/>
+          </a:xfrm>
+        </p:spPr>
+        <p:txBody>
+          <a:bodyPr>
+            <a:normAutofit fontScale="92500" lnSpcReduction="10000"/>
+          </a:bodyPr>
+          <a:lstStyle/>
+          <a:p>
+            <a:r>
+              <a:rPr lang="en-US" dirty="0"/>
+              <a:t>Last time, we learned about </a:t>
+            </a:r>
+            <a:r>
+              <a:rPr lang="en-US" dirty="0">
+                <a:solidFill>
+                  <a:schemeClr val="accent1"/>
+                </a:solidFill>
+              </a:rPr>
+              <a:t>R (programming language) </a:t>
+            </a:r>
+            <a:r>
+              <a:rPr lang="en-US" dirty="0"/>
+              <a:t>and </a:t>
+            </a:r>
+            <a:r>
+              <a:rPr lang="en-US" dirty="0">
+                <a:solidFill>
+                  <a:schemeClr val="accent1"/>
+                </a:solidFill>
+              </a:rPr>
+              <a:t>R Studio (application for writing R code) </a:t>
+            </a:r>
+          </a:p>
+          <a:p>
+            <a:r>
+              <a:rPr lang="en-US" dirty="0"/>
+              <a:t>We learned how to use </a:t>
+            </a:r>
+            <a:r>
+              <a:rPr lang="en-US" dirty="0">
+                <a:solidFill>
+                  <a:schemeClr val="accent6"/>
+                </a:solidFill>
+              </a:rPr>
+              <a:t>R notebooks (.</a:t>
+            </a:r>
+            <a:r>
+              <a:rPr lang="en-US" dirty="0" err="1">
+                <a:solidFill>
+                  <a:schemeClr val="accent6"/>
+                </a:solidFill>
+              </a:rPr>
+              <a:t>Rmd</a:t>
+            </a:r>
+            <a:r>
+              <a:rPr lang="en-US" dirty="0">
+                <a:solidFill>
+                  <a:schemeClr val="accent6"/>
+                </a:solidFill>
+              </a:rPr>
+              <a:t>)</a:t>
+            </a:r>
+            <a:r>
+              <a:rPr lang="en-US" dirty="0"/>
+              <a:t>, which allow us to combine text and </a:t>
+            </a:r>
+            <a:r>
+              <a:rPr lang="en-US" dirty="0">
+                <a:solidFill>
+                  <a:schemeClr val="accent6"/>
+                </a:solidFill>
+              </a:rPr>
+              <a:t>code chunks </a:t>
+            </a:r>
+            <a:r>
+              <a:rPr lang="en-US" dirty="0"/>
+              <a:t>into a single document  </a:t>
+            </a:r>
+          </a:p>
+          <a:p>
+            <a:r>
+              <a:rPr lang="en-US" dirty="0"/>
+              <a:t>We learned some basic functionality: </a:t>
             </a:r>
           </a:p>
           <a:p>
             <a:pPr lvl="1"/>
             <a:r>
               <a:rPr lang="en-US" dirty="0"/>
-              <a:t>Expressions </a:t>
-            </a:r>
+              <a:t>Comments</a:t>
+            </a:r>
+            <a:endParaRPr lang="en-US" sz="1500" dirty="0">
+              <a:highlight>
+                <a:srgbClr val="C0C0C0"/>
+              </a:highlight>
+              <a:latin typeface="Courier" pitchFamily="2" charset="0"/>
+            </a:endParaRPr>
           </a:p>
           <a:p>
             <a:pPr lvl="1"/>
             <a:r>
               <a:rPr lang="en-US" dirty="0"/>
-              <a:t>Variables</a:t>
-            </a:r>
+              <a:t>Installing packages</a:t>
+            </a:r>
+            <a:endParaRPr lang="en-US" sz="1500" dirty="0"/>
           </a:p>
           <a:p>
             <a:pPr lvl="1"/>
             <a:r>
               <a:rPr lang="en-US" dirty="0"/>
-              <a:t>Vector</a:t>
+              <a:t>Loading packages</a:t>
             </a:r>
           </a:p>
           <a:p>
             <a:pPr lvl="1"/>
             <a:r>
-              <a:rPr lang="en-US"/>
-              <a:t>Lists</a:t>
-            </a:r>
+              <a:rPr lang="en-US" dirty="0"/>
+              <a:t>Loading a dataset </a:t>
+            </a:r>
+          </a:p>
+          <a:p>
+            <a:pPr lvl="1"/>
+            <a:r>
+              <a:rPr lang="en-US" dirty="0"/>
+              <a:t>Doing arithmetic operations </a:t>
+            </a:r>
+          </a:p>
+          <a:p>
+            <a:pPr lvl="1"/>
             <a:endParaRPr lang="en-US" dirty="0"/>
           </a:p>
-          <a:p>
-            <a:pPr lvl="1"/>
-            <a:r>
-              <a:rPr lang="en-US" dirty="0"/>
-              <a:t>Function </a:t>
-            </a:r>
-          </a:p>
-          <a:p>
-            <a:pPr lvl="1"/>
-            <a:r>
-              <a:rPr lang="en-US" dirty="0"/>
-              <a:t>Comments  </a:t>
-            </a:r>
-          </a:p>
-          <a:p>
-            <a:pPr lvl="1"/>
-            <a:r>
-              <a:rPr lang="en-US" dirty="0" err="1"/>
-              <a:t>Dataframe</a:t>
-            </a:r>
-            <a:r>
-              <a:rPr lang="en-US" dirty="0"/>
-              <a:t> </a:t>
-            </a:r>
-          </a:p>
-          <a:p>
-            <a:pPr lvl="1"/>
-            <a:r>
-              <a:rPr lang="en-US" dirty="0"/>
-              <a:t>Common functions for </a:t>
-            </a:r>
-            <a:r>
-              <a:rPr lang="en-US" dirty="0" err="1"/>
-              <a:t>dataframe</a:t>
-            </a:r>
-            <a:r>
-              <a:rPr lang="en-US" dirty="0"/>
-              <a:t> operations </a:t>
-            </a:r>
-          </a:p>
-        </p:txBody>
-      </p:sp>
+        </p:txBody>
+      </p:sp>
+      <p:pic>
+        <p:nvPicPr>
+          <p:cNvPr id="1026" name="Picture 2" descr="An R Notebook example.">
+            <a:extLst>
+              <a:ext uri="{FF2B5EF4-FFF2-40B4-BE49-F238E27FC236}">
+                <a16:creationId xmlns:a16="http://schemas.microsoft.com/office/drawing/2014/main" id="{B5179293-D12D-184B-958D-5E75EBD4065C}"/>
+              </a:ext>
+            </a:extLst>
+          </p:cNvPr>
+          <p:cNvPicPr>
+            <a:picLocks noChangeAspect="1" noChangeArrowheads="1"/>
+          </p:cNvPicPr>
+          <p:nvPr/>
+        </p:nvPicPr>
+        <p:blipFill>
+          <a:blip r:embed="rId2">
+            <a:extLst>
+              <a:ext uri="{28A0092B-C50C-407E-A947-70E740481C1C}">
+                <a14:useLocalDpi xmlns:a14="http://schemas.microsoft.com/office/drawing/2010/main" val="0"/>
+              </a:ext>
+            </a:extLst>
+          </a:blip>
+          <a:srcRect/>
+          <a:stretch>
+            <a:fillRect/>
+          </a:stretch>
+        </p:blipFill>
+        <p:spPr bwMode="auto">
+          <a:xfrm>
+            <a:off x="7182853" y="1009652"/>
+            <a:ext cx="4774978" cy="5167311"/>
+          </a:xfrm>
+          <a:prstGeom prst="rect">
+            <a:avLst/>
+          </a:prstGeom>
+          <a:noFill/>
+          <a:extLst>
+            <a:ext uri="{909E8E84-426E-40DD-AFC4-6F175D3DCCD1}">
+              <a14:hiddenFill xmlns:a14="http://schemas.microsoft.com/office/drawing/2010/main">
+                <a:solidFill>
+                  <a:srgbClr val="FFFFFF"/>
+                </a:solidFill>
+              </a14:hiddenFill>
+            </a:ext>
+          </a:extLst>
+        </p:spPr>
+      </p:pic>
     </p:spTree>
     <p:extLst>
       <p:ext uri="{BB962C8B-B14F-4D97-AF65-F5344CB8AC3E}">
-        <p14:creationId xmlns:p14="http://schemas.microsoft.com/office/powerpoint/2010/main" val="4155799026"/>
+        <p14:creationId xmlns:p14="http://schemas.microsoft.com/office/powerpoint/2010/main" val="822235595"/>
       </p:ext>
     </p:extLst>
   </p:cSld>
@@ -3582,7 +4467,7 @@
           <p:cNvPr id="2" name="Title 1">
             <a:extLst>
               <a:ext uri="{FF2B5EF4-FFF2-40B4-BE49-F238E27FC236}">
-                <a16:creationId xmlns:a16="http://schemas.microsoft.com/office/drawing/2014/main" id="{F798071A-E7E5-1C48-8D81-4F1D52842F14}"/>
+                <a16:creationId xmlns:a16="http://schemas.microsoft.com/office/drawing/2014/main" id="{7C043B37-EB9A-894D-A8B2-D53998092A4A}"/>
               </a:ext>
             </a:extLst>
           </p:cNvPr>
@@ -3600,7 +4485,7 @@
           <a:p>
             <a:r>
               <a:rPr lang="en-US" dirty="0"/>
-              <a:t>Exit survey </a:t>
+              <a:t>Agenda </a:t>
             </a:r>
           </a:p>
         </p:txBody>
@@ -3610,7 +4495,7 @@
           <p:cNvPr id="3" name="Content Placeholder 2">
             <a:extLst>
               <a:ext uri="{FF2B5EF4-FFF2-40B4-BE49-F238E27FC236}">
-                <a16:creationId xmlns:a16="http://schemas.microsoft.com/office/drawing/2014/main" id="{3DDAD18F-8C3E-204C-9955-86D038426159}"/>
+                <a16:creationId xmlns:a16="http://schemas.microsoft.com/office/drawing/2014/main" id="{FA85A48F-9549-3440-9F03-9696FDA420AB}"/>
               </a:ext>
             </a:extLst>
           </p:cNvPr>
@@ -3621,24 +4506,678 @@
             <p:ph idx="1"/>
           </p:nvPr>
         </p:nvSpPr>
-        <p:spPr>
-          <a:xfrm>
-            <a:off x="838200" y="1825625"/>
-            <a:ext cx="5257800" cy="4351338"/>
-          </a:xfrm>
-        </p:spPr>
-        <p:txBody>
-          <a:bodyPr/>
-          <a:lstStyle/>
-          <a:p>
-            <a:endParaRPr lang="en-US" dirty="0"/>
+        <p:spPr/>
+        <p:txBody>
+          <a:bodyPr/>
+          <a:lstStyle/>
+          <a:p>
+            <a:r>
+              <a:rPr lang="en-US" dirty="0"/>
+              <a:t>Errors versus warnings </a:t>
+            </a:r>
+          </a:p>
+          <a:p>
+            <a:r>
+              <a:rPr lang="en-US" dirty="0"/>
+              <a:t>Learn about basic R syntax </a:t>
+            </a:r>
+          </a:p>
+          <a:p>
+            <a:pPr lvl="1"/>
+            <a:r>
+              <a:rPr lang="en-US" dirty="0"/>
+              <a:t>Expressions </a:t>
+            </a:r>
+          </a:p>
+          <a:p>
+            <a:pPr lvl="1"/>
+            <a:r>
+              <a:rPr lang="en-US" dirty="0"/>
+              <a:t>Variables</a:t>
+            </a:r>
+          </a:p>
+          <a:p>
+            <a:pPr lvl="1"/>
+            <a:r>
+              <a:rPr lang="en-US" dirty="0"/>
+              <a:t>Vector</a:t>
+            </a:r>
+          </a:p>
+          <a:p>
+            <a:pPr lvl="1"/>
+            <a:r>
+              <a:rPr lang="en-US" dirty="0"/>
+              <a:t>Function </a:t>
+            </a:r>
+          </a:p>
+          <a:p>
+            <a:pPr lvl="1"/>
+            <a:r>
+              <a:rPr lang="en-US" dirty="0" err="1"/>
+              <a:t>Dataframe</a:t>
+            </a:r>
+            <a:r>
+              <a:rPr lang="en-US" dirty="0"/>
+              <a:t> </a:t>
+            </a:r>
+          </a:p>
+          <a:p>
+            <a:pPr lvl="1"/>
+            <a:r>
+              <a:rPr lang="en-US" dirty="0"/>
+              <a:t>Common functions for </a:t>
+            </a:r>
+            <a:r>
+              <a:rPr lang="en-US" dirty="0" err="1"/>
+              <a:t>dataframe</a:t>
+            </a:r>
+            <a:r>
+              <a:rPr lang="en-US" dirty="0"/>
+              <a:t> operations </a:t>
+            </a:r>
           </a:p>
         </p:txBody>
       </p:sp>
     </p:spTree>
     <p:extLst>
       <p:ext uri="{BB962C8B-B14F-4D97-AF65-F5344CB8AC3E}">
-        <p14:creationId xmlns:p14="http://schemas.microsoft.com/office/powerpoint/2010/main" val="788823114"/>
+        <p14:creationId xmlns:p14="http://schemas.microsoft.com/office/powerpoint/2010/main" val="4155799026"/>
+      </p:ext>
+    </p:extLst>
+  </p:cSld>
+  <p:clrMapOvr>
+    <a:masterClrMapping/>
+  </p:clrMapOvr>
+</p:sld>
+</file>
+
+<file path=ppt/slides/slide4.xml><?xml version="1.0" encoding="utf-8"?>
+<p:sld xmlns:a="http://schemas.openxmlformats.org/drawingml/2006/main" xmlns:r="http://schemas.openxmlformats.org/officeDocument/2006/relationships" xmlns:p="http://schemas.openxmlformats.org/presentationml/2006/main">
+  <p:cSld>
+    <p:spTree>
+      <p:nvGrpSpPr>
+        <p:cNvPr id="1" name=""/>
+        <p:cNvGrpSpPr/>
+        <p:nvPr/>
+      </p:nvGrpSpPr>
+      <p:grpSpPr>
+        <a:xfrm>
+          <a:off x="0" y="0"/>
+          <a:ext cx="0" cy="0"/>
+          <a:chOff x="0" y="0"/>
+          <a:chExt cx="0" cy="0"/>
+        </a:xfrm>
+      </p:grpSpPr>
+      <p:sp>
+        <p:nvSpPr>
+          <p:cNvPr id="2" name="Title 1">
+            <a:extLst>
+              <a:ext uri="{FF2B5EF4-FFF2-40B4-BE49-F238E27FC236}">
+                <a16:creationId xmlns:a16="http://schemas.microsoft.com/office/drawing/2014/main" id="{F50DC380-2F7B-EC4F-8501-5FCD380180D8}"/>
+              </a:ext>
+            </a:extLst>
+          </p:cNvPr>
+          <p:cNvSpPr>
+            <a:spLocks noGrp="1"/>
+          </p:cNvSpPr>
+          <p:nvPr>
+            <p:ph type="title"/>
+          </p:nvPr>
+        </p:nvSpPr>
+        <p:spPr/>
+        <p:txBody>
+          <a:bodyPr/>
+          <a:lstStyle/>
+          <a:p>
+            <a:r>
+              <a:rPr lang="en-US" dirty="0"/>
+              <a:t>Messages versus Error versus Warning </a:t>
+            </a:r>
+          </a:p>
+        </p:txBody>
+      </p:sp>
+      <p:sp>
+        <p:nvSpPr>
+          <p:cNvPr id="3" name="Content Placeholder 2">
+            <a:extLst>
+              <a:ext uri="{FF2B5EF4-FFF2-40B4-BE49-F238E27FC236}">
+                <a16:creationId xmlns:a16="http://schemas.microsoft.com/office/drawing/2014/main" id="{03753AD0-B7FA-5043-8E3A-6B0ECD95A334}"/>
+              </a:ext>
+            </a:extLst>
+          </p:cNvPr>
+          <p:cNvSpPr>
+            <a:spLocks noGrp="1"/>
+          </p:cNvSpPr>
+          <p:nvPr>
+            <p:ph idx="1"/>
+          </p:nvPr>
+        </p:nvSpPr>
+        <p:spPr>
+          <a:xfrm>
+            <a:off x="477078" y="1825625"/>
+            <a:ext cx="5980872" cy="4351338"/>
+          </a:xfrm>
+        </p:spPr>
+        <p:txBody>
+          <a:bodyPr>
+            <a:normAutofit fontScale="92500"/>
+          </a:bodyPr>
+          <a:lstStyle/>
+          <a:p>
+            <a:r>
+              <a:rPr lang="en-US" b="1" dirty="0"/>
+              <a:t>Messages: </a:t>
+            </a:r>
+            <a:r>
+              <a:rPr lang="en-US" dirty="0"/>
+              <a:t>Everything is normal. These are for informational purposes</a:t>
+            </a:r>
+          </a:p>
+          <a:p>
+            <a:r>
+              <a:rPr lang="en-US" b="1" dirty="0"/>
+              <a:t>Error</a:t>
+            </a:r>
+            <a:r>
+              <a:rPr lang="en-US" dirty="0"/>
+              <a:t>: Something is wrong. If there is an error, the code will not run! </a:t>
+            </a:r>
+          </a:p>
+          <a:p>
+            <a:r>
+              <a:rPr lang="en-US" b="1" dirty="0"/>
+              <a:t>Warning</a:t>
+            </a:r>
+            <a:r>
+              <a:rPr lang="en-US" dirty="0"/>
+              <a:t>: Something </a:t>
+            </a:r>
+            <a:r>
+              <a:rPr lang="en-US" i="1" dirty="0"/>
+              <a:t>might</a:t>
+            </a:r>
+            <a:r>
+              <a:rPr lang="en-US" dirty="0"/>
+              <a:t> </a:t>
+            </a:r>
+            <a:r>
+              <a:rPr lang="en-US" i="1" dirty="0"/>
+              <a:t>be</a:t>
+            </a:r>
+            <a:r>
+              <a:rPr lang="en-US" dirty="0"/>
+              <a:t> wrong. If there is a warning, the code will still run </a:t>
+            </a:r>
+          </a:p>
+          <a:p>
+            <a:r>
+              <a:rPr lang="en-US" dirty="0"/>
+              <a:t>How to debug: </a:t>
+            </a:r>
+          </a:p>
+          <a:p>
+            <a:pPr lvl="1"/>
+            <a:r>
+              <a:rPr lang="en-US" dirty="0"/>
+              <a:t>Read the message and double check your code </a:t>
+            </a:r>
+          </a:p>
+          <a:p>
+            <a:pPr lvl="1"/>
+            <a:r>
+              <a:rPr lang="en-US" dirty="0"/>
+              <a:t>Google (or use </a:t>
+            </a:r>
+            <a:r>
+              <a:rPr lang="en-US" dirty="0" err="1"/>
+              <a:t>ChatGPT</a:t>
+            </a:r>
+            <a:r>
+              <a:rPr lang="en-US" dirty="0"/>
+              <a:t>) to figure out the error </a:t>
+            </a:r>
+          </a:p>
+        </p:txBody>
+      </p:sp>
+      <p:pic>
+        <p:nvPicPr>
+          <p:cNvPr id="1026" name="Picture 2">
+            <a:extLst>
+              <a:ext uri="{FF2B5EF4-FFF2-40B4-BE49-F238E27FC236}">
+                <a16:creationId xmlns:a16="http://schemas.microsoft.com/office/drawing/2014/main" id="{296FEB9B-CC91-2D4C-80F0-60A66C5E6EB3}"/>
+              </a:ext>
+            </a:extLst>
+          </p:cNvPr>
+          <p:cNvPicPr>
+            <a:picLocks noChangeAspect="1" noChangeArrowheads="1"/>
+          </p:cNvPicPr>
+          <p:nvPr/>
+        </p:nvPicPr>
+        <p:blipFill>
+          <a:blip r:embed="rId2">
+            <a:extLst>
+              <a:ext uri="{28A0092B-C50C-407E-A947-70E740481C1C}">
+                <a14:useLocalDpi xmlns:a14="http://schemas.microsoft.com/office/drawing/2010/main" val="0"/>
+              </a:ext>
+            </a:extLst>
+          </a:blip>
+          <a:srcRect/>
+          <a:stretch>
+            <a:fillRect/>
+          </a:stretch>
+        </p:blipFill>
+        <p:spPr bwMode="auto">
+          <a:xfrm>
+            <a:off x="6771138" y="3664384"/>
+            <a:ext cx="4857538" cy="1299110"/>
+          </a:xfrm>
+          <a:prstGeom prst="rect">
+            <a:avLst/>
+          </a:prstGeom>
+          <a:noFill/>
+          <a:extLst>
+            <a:ext uri="{909E8E84-426E-40DD-AFC4-6F175D3DCCD1}">
+              <a14:hiddenFill xmlns:a14="http://schemas.microsoft.com/office/drawing/2010/main">
+                <a:solidFill>
+                  <a:srgbClr val="FFFFFF"/>
+                </a:solidFill>
+              </a14:hiddenFill>
+            </a:ext>
+          </a:extLst>
+        </p:spPr>
+      </p:pic>
+      <p:pic>
+        <p:nvPicPr>
+          <p:cNvPr id="5" name="Picture 4" descr="A close up of a text&#10;&#10;Description automatically generated">
+            <a:extLst>
+              <a:ext uri="{FF2B5EF4-FFF2-40B4-BE49-F238E27FC236}">
+                <a16:creationId xmlns:a16="http://schemas.microsoft.com/office/drawing/2014/main" id="{DD165653-D90A-3F4C-B759-069681C50794}"/>
+              </a:ext>
+            </a:extLst>
+          </p:cNvPr>
+          <p:cNvPicPr>
+            <a:picLocks noChangeAspect="1"/>
+          </p:cNvPicPr>
+          <p:nvPr/>
+        </p:nvPicPr>
+        <p:blipFill>
+          <a:blip r:embed="rId3"/>
+          <a:stretch>
+            <a:fillRect/>
+          </a:stretch>
+        </p:blipFill>
+        <p:spPr>
+          <a:xfrm>
+            <a:off x="6684893" y="5561072"/>
+            <a:ext cx="4528103" cy="615891"/>
+          </a:xfrm>
+          <a:prstGeom prst="rect">
+            <a:avLst/>
+          </a:prstGeom>
+        </p:spPr>
+      </p:pic>
+      <p:pic>
+        <p:nvPicPr>
+          <p:cNvPr id="7" name="Picture 6" descr="A screenshot of a computer code&#10;&#10;Description automatically generated">
+            <a:extLst>
+              <a:ext uri="{FF2B5EF4-FFF2-40B4-BE49-F238E27FC236}">
+                <a16:creationId xmlns:a16="http://schemas.microsoft.com/office/drawing/2014/main" id="{5C2E0CD2-BC11-B648-8223-B36ED315373B}"/>
+              </a:ext>
+            </a:extLst>
+          </p:cNvPr>
+          <p:cNvPicPr>
+            <a:picLocks noChangeAspect="1"/>
+          </p:cNvPicPr>
+          <p:nvPr/>
+        </p:nvPicPr>
+        <p:blipFill rotWithShape="1">
+          <a:blip r:embed="rId4"/>
+          <a:srcRect b="34565"/>
+          <a:stretch/>
+        </p:blipFill>
+        <p:spPr>
+          <a:xfrm>
+            <a:off x="6684893" y="1716777"/>
+            <a:ext cx="5030029" cy="1476840"/>
+          </a:xfrm>
+          <a:prstGeom prst="rect">
+            <a:avLst/>
+          </a:prstGeom>
+        </p:spPr>
+      </p:pic>
+      <p:sp>
+        <p:nvSpPr>
+          <p:cNvPr id="8" name="TextBox 7">
+            <a:extLst>
+              <a:ext uri="{FF2B5EF4-FFF2-40B4-BE49-F238E27FC236}">
+                <a16:creationId xmlns:a16="http://schemas.microsoft.com/office/drawing/2014/main" id="{454B48E0-6F01-6A4F-8987-BE16BA7EA2CA}"/>
+              </a:ext>
+            </a:extLst>
+          </p:cNvPr>
+          <p:cNvSpPr txBox="1"/>
+          <p:nvPr/>
+        </p:nvSpPr>
+        <p:spPr>
+          <a:xfrm>
+            <a:off x="6684893" y="1334401"/>
+            <a:ext cx="1930470" cy="369332"/>
+          </a:xfrm>
+          <a:prstGeom prst="rect">
+            <a:avLst/>
+          </a:prstGeom>
+          <a:noFill/>
+        </p:spPr>
+        <p:txBody>
+          <a:bodyPr wrap="square" rtlCol="0">
+            <a:spAutoFit/>
+          </a:bodyPr>
+          <a:lstStyle/>
+          <a:p>
+            <a:r>
+              <a:rPr lang="en-US" dirty="0"/>
+              <a:t>Message: </a:t>
+            </a:r>
+          </a:p>
+        </p:txBody>
+      </p:sp>
+      <p:sp>
+        <p:nvSpPr>
+          <p:cNvPr id="10" name="TextBox 9">
+            <a:extLst>
+              <a:ext uri="{FF2B5EF4-FFF2-40B4-BE49-F238E27FC236}">
+                <a16:creationId xmlns:a16="http://schemas.microsoft.com/office/drawing/2014/main" id="{006DBFDC-8606-9442-BE4F-81653E2918E5}"/>
+              </a:ext>
+            </a:extLst>
+          </p:cNvPr>
+          <p:cNvSpPr txBox="1"/>
+          <p:nvPr/>
+        </p:nvSpPr>
+        <p:spPr>
+          <a:xfrm>
+            <a:off x="6684893" y="3295052"/>
+            <a:ext cx="1930470" cy="369332"/>
+          </a:xfrm>
+          <a:prstGeom prst="rect">
+            <a:avLst/>
+          </a:prstGeom>
+          <a:noFill/>
+        </p:spPr>
+        <p:txBody>
+          <a:bodyPr wrap="square" rtlCol="0">
+            <a:spAutoFit/>
+          </a:bodyPr>
+          <a:lstStyle/>
+          <a:p>
+            <a:r>
+              <a:rPr lang="en-US" dirty="0"/>
+              <a:t>Error: </a:t>
+            </a:r>
+          </a:p>
+        </p:txBody>
+      </p:sp>
+      <p:sp>
+        <p:nvSpPr>
+          <p:cNvPr id="11" name="TextBox 10">
+            <a:extLst>
+              <a:ext uri="{FF2B5EF4-FFF2-40B4-BE49-F238E27FC236}">
+                <a16:creationId xmlns:a16="http://schemas.microsoft.com/office/drawing/2014/main" id="{36E4F8BC-E838-B54D-B061-323AB5F62A39}"/>
+              </a:ext>
+            </a:extLst>
+          </p:cNvPr>
+          <p:cNvSpPr txBox="1"/>
+          <p:nvPr/>
+        </p:nvSpPr>
+        <p:spPr>
+          <a:xfrm>
+            <a:off x="6727757" y="5191740"/>
+            <a:ext cx="1930470" cy="369332"/>
+          </a:xfrm>
+          <a:prstGeom prst="rect">
+            <a:avLst/>
+          </a:prstGeom>
+          <a:noFill/>
+        </p:spPr>
+        <p:txBody>
+          <a:bodyPr wrap="square" rtlCol="0">
+            <a:spAutoFit/>
+          </a:bodyPr>
+          <a:lstStyle/>
+          <a:p>
+            <a:r>
+              <a:rPr lang="en-US" dirty="0"/>
+              <a:t>Warning: </a:t>
+            </a:r>
+          </a:p>
+        </p:txBody>
+      </p:sp>
+    </p:spTree>
+    <p:extLst>
+      <p:ext uri="{BB962C8B-B14F-4D97-AF65-F5344CB8AC3E}">
+        <p14:creationId xmlns:p14="http://schemas.microsoft.com/office/powerpoint/2010/main" val="2707658030"/>
+      </p:ext>
+    </p:extLst>
+  </p:cSld>
+  <p:clrMapOvr>
+    <a:masterClrMapping/>
+  </p:clrMapOvr>
+</p:sld>
+</file>
+
+<file path=ppt/slides/slide5.xml><?xml version="1.0" encoding="utf-8"?>
+<p:sld xmlns:a="http://schemas.openxmlformats.org/drawingml/2006/main" xmlns:r="http://schemas.openxmlformats.org/officeDocument/2006/relationships" xmlns:p="http://schemas.openxmlformats.org/presentationml/2006/main">
+  <p:cSld>
+    <p:spTree>
+      <p:nvGrpSpPr>
+        <p:cNvPr id="1" name=""/>
+        <p:cNvGrpSpPr/>
+        <p:nvPr/>
+      </p:nvGrpSpPr>
+      <p:grpSpPr>
+        <a:xfrm>
+          <a:off x="0" y="0"/>
+          <a:ext cx="0" cy="0"/>
+          <a:chOff x="0" y="0"/>
+          <a:chExt cx="0" cy="0"/>
+        </a:xfrm>
+      </p:grpSpPr>
+      <p:sp>
+        <p:nvSpPr>
+          <p:cNvPr id="2" name="Title 1">
+            <a:extLst>
+              <a:ext uri="{FF2B5EF4-FFF2-40B4-BE49-F238E27FC236}">
+                <a16:creationId xmlns:a16="http://schemas.microsoft.com/office/drawing/2014/main" id="{C204721E-82EC-3247-A973-9E9440AF7190}"/>
+              </a:ext>
+            </a:extLst>
+          </p:cNvPr>
+          <p:cNvSpPr>
+            <a:spLocks noGrp="1"/>
+          </p:cNvSpPr>
+          <p:nvPr>
+            <p:ph type="title"/>
+          </p:nvPr>
+        </p:nvSpPr>
+        <p:spPr/>
+        <p:txBody>
+          <a:bodyPr/>
+          <a:lstStyle/>
+          <a:p>
+            <a:r>
+              <a:rPr lang="en-US" dirty="0"/>
+              <a:t>Guided tutorial (30 minutes) </a:t>
+            </a:r>
+          </a:p>
+        </p:txBody>
+      </p:sp>
+      <p:sp>
+        <p:nvSpPr>
+          <p:cNvPr id="3" name="Content Placeholder 2">
+            <a:extLst>
+              <a:ext uri="{FF2B5EF4-FFF2-40B4-BE49-F238E27FC236}">
+                <a16:creationId xmlns:a16="http://schemas.microsoft.com/office/drawing/2014/main" id="{BA7707CF-5153-A54F-8DE6-7C592F79C05D}"/>
+              </a:ext>
+            </a:extLst>
+          </p:cNvPr>
+          <p:cNvSpPr>
+            <a:spLocks noGrp="1"/>
+          </p:cNvSpPr>
+          <p:nvPr>
+            <p:ph idx="1"/>
+          </p:nvPr>
+        </p:nvSpPr>
+        <p:spPr/>
+        <p:txBody>
+          <a:bodyPr/>
+          <a:lstStyle/>
+          <a:p>
+            <a:pPr marL="0" indent="0">
+              <a:buNone/>
+            </a:pPr>
+            <a:r>
+              <a:rPr lang="en-US" dirty="0"/>
+              <a:t>Today, we will learn the basics of R syntax. </a:t>
+            </a:r>
+          </a:p>
+          <a:p>
+            <a:pPr marL="514350" indent="-514350">
+              <a:buAutoNum type="arabicPeriod"/>
+            </a:pPr>
+            <a:r>
+              <a:rPr lang="en-US" dirty="0"/>
+              <a:t>Go to </a:t>
+            </a:r>
+            <a:r>
+              <a:rPr lang="en-US" dirty="0">
+                <a:hlinkClick r:id="rId3"/>
+              </a:rPr>
+              <a:t>bit.ly/crisp2025</a:t>
+            </a:r>
+            <a:r>
+              <a:rPr lang="en-US" dirty="0"/>
+              <a:t>. </a:t>
+            </a:r>
+          </a:p>
+          <a:p>
+            <a:pPr marL="514350" indent="-514350">
+              <a:buAutoNum type="arabicPeriod"/>
+            </a:pPr>
+            <a:r>
+              <a:rPr lang="en-US" dirty="0"/>
+              <a:t>Download </a:t>
+            </a:r>
+            <a:r>
+              <a:rPr lang="en-US" dirty="0" err="1"/>
+              <a:t>Rmd</a:t>
+            </a:r>
+            <a:r>
+              <a:rPr lang="en-US" dirty="0"/>
+              <a:t> file for today into your CRISP R notes folder.</a:t>
+            </a:r>
+          </a:p>
+          <a:p>
+            <a:pPr marL="514350" indent="-514350">
+              <a:buAutoNum type="arabicPeriod"/>
+            </a:pPr>
+            <a:r>
+              <a:rPr lang="en-US" dirty="0"/>
+              <a:t>We will go through the tutorial (until the exercises) together! Try to follow along, and type and run the code as I do it.   </a:t>
+            </a:r>
+          </a:p>
+        </p:txBody>
+      </p:sp>
+    </p:spTree>
+    <p:extLst>
+      <p:ext uri="{BB962C8B-B14F-4D97-AF65-F5344CB8AC3E}">
+        <p14:creationId xmlns:p14="http://schemas.microsoft.com/office/powerpoint/2010/main" val="3197897"/>
+      </p:ext>
+    </p:extLst>
+  </p:cSld>
+  <p:clrMapOvr>
+    <a:masterClrMapping/>
+  </p:clrMapOvr>
+</p:sld>
+</file>
+
+<file path=ppt/slides/slide6.xml><?xml version="1.0" encoding="utf-8"?>
+<p:sld xmlns:a="http://schemas.openxmlformats.org/drawingml/2006/main" xmlns:r="http://schemas.openxmlformats.org/officeDocument/2006/relationships" xmlns:p="http://schemas.openxmlformats.org/presentationml/2006/main">
+  <p:cSld>
+    <p:spTree>
+      <p:nvGrpSpPr>
+        <p:cNvPr id="1" name=""/>
+        <p:cNvGrpSpPr/>
+        <p:nvPr/>
+      </p:nvGrpSpPr>
+      <p:grpSpPr>
+        <a:xfrm>
+          <a:off x="0" y="0"/>
+          <a:ext cx="0" cy="0"/>
+          <a:chOff x="0" y="0"/>
+          <a:chExt cx="0" cy="0"/>
+        </a:xfrm>
+      </p:grpSpPr>
+      <p:sp>
+        <p:nvSpPr>
+          <p:cNvPr id="2" name="Title 1">
+            <a:extLst>
+              <a:ext uri="{FF2B5EF4-FFF2-40B4-BE49-F238E27FC236}">
+                <a16:creationId xmlns:a16="http://schemas.microsoft.com/office/drawing/2014/main" id="{049FCC8E-766F-4F47-9596-6B6AE350E615}"/>
+              </a:ext>
+            </a:extLst>
+          </p:cNvPr>
+          <p:cNvSpPr>
+            <a:spLocks noGrp="1"/>
+          </p:cNvSpPr>
+          <p:nvPr>
+            <p:ph type="title"/>
+          </p:nvPr>
+        </p:nvSpPr>
+        <p:spPr/>
+        <p:txBody>
+          <a:bodyPr/>
+          <a:lstStyle/>
+          <a:p>
+            <a:r>
+              <a:rPr lang="en-US" dirty="0"/>
+              <a:t>Self-guided exercises (20 minutes) </a:t>
+            </a:r>
+          </a:p>
+        </p:txBody>
+      </p:sp>
+      <p:sp>
+        <p:nvSpPr>
+          <p:cNvPr id="3" name="Content Placeholder 2">
+            <a:extLst>
+              <a:ext uri="{FF2B5EF4-FFF2-40B4-BE49-F238E27FC236}">
+                <a16:creationId xmlns:a16="http://schemas.microsoft.com/office/drawing/2014/main" id="{1BA9DE2D-1E77-DA45-A84A-2DA1C95F7995}"/>
+              </a:ext>
+            </a:extLst>
+          </p:cNvPr>
+          <p:cNvSpPr>
+            <a:spLocks noGrp="1"/>
+          </p:cNvSpPr>
+          <p:nvPr>
+            <p:ph idx="1"/>
+          </p:nvPr>
+        </p:nvSpPr>
+        <p:spPr/>
+        <p:txBody>
+          <a:bodyPr/>
+          <a:lstStyle/>
+          <a:p>
+            <a:r>
+              <a:rPr lang="en-US" dirty="0"/>
+              <a:t>Complete </a:t>
+            </a:r>
+            <a:r>
+              <a:rPr lang="en-US"/>
+              <a:t>the exercises!</a:t>
+            </a:r>
+          </a:p>
+        </p:txBody>
+      </p:sp>
+    </p:spTree>
+    <p:extLst>
+      <p:ext uri="{BB962C8B-B14F-4D97-AF65-F5344CB8AC3E}">
+        <p14:creationId xmlns:p14="http://schemas.microsoft.com/office/powerpoint/2010/main" val="3363772434"/>
       </p:ext>
     </p:extLst>
   </p:cSld>
@@ -3941,4 +5480,299 @@
     </a:ext>
   </a:extLst>
 </a:theme>
+</file>
+
+<file path=ppt/theme/theme2.xml><?xml version="1.0" encoding="utf-8"?>
+<a:theme xmlns:a="http://schemas.openxmlformats.org/drawingml/2006/main" name="Office Theme">
+  <a:themeElements>
+    <a:clrScheme name="Office">
+      <a:dk1>
+        <a:sysClr val="windowText" lastClr="000000"/>
+      </a:dk1>
+      <a:lt1>
+        <a:sysClr val="window" lastClr="FFFFFF"/>
+      </a:lt1>
+      <a:dk2>
+        <a:srgbClr val="44546A"/>
+      </a:dk2>
+      <a:lt2>
+        <a:srgbClr val="E7E6E6"/>
+      </a:lt2>
+      <a:accent1>
+        <a:srgbClr val="4472C4"/>
+      </a:accent1>
+      <a:accent2>
+        <a:srgbClr val="ED7D31"/>
+      </a:accent2>
+      <a:accent3>
+        <a:srgbClr val="A5A5A5"/>
+      </a:accent3>
+      <a:accent4>
+        <a:srgbClr val="FFC000"/>
+      </a:accent4>
+      <a:accent5>
+        <a:srgbClr val="5B9BD5"/>
+      </a:accent5>
+      <a:accent6>
+        <a:srgbClr val="70AD47"/>
+      </a:accent6>
+      <a:hlink>
+        <a:srgbClr val="0563C1"/>
+      </a:hlink>
+      <a:folHlink>
+        <a:srgbClr val="954F72"/>
+      </a:folHlink>
+    </a:clrScheme>
+    <a:fontScheme name="Office">
+      <a:majorFont>
+        <a:latin typeface="Calibri Light" panose="020F0302020204030204"/>
+        <a:ea typeface=""/>
+        <a:cs typeface=""/>
+        <a:font script="Jpan" typeface="游ゴシック Light"/>
+        <a:font script="Hang" typeface="맑은 고딕"/>
+        <a:font script="Hans" typeface="等线 Light"/>
+        <a:font script="Hant" typeface="新細明體"/>
+        <a:font script="Arab" typeface="Times New Roman"/>
+        <a:font script="Hebr" typeface="Times New Roman"/>
+        <a:font script="Thai" typeface="Angsana New"/>
+        <a:font script="Ethi" typeface="Nyala"/>
+        <a:font script="Beng" typeface="Vrinda"/>
+        <a:font script="Gujr" typeface="Shruti"/>
+        <a:font script="Khmr" typeface="MoolBoran"/>
+        <a:font script="Knda" typeface="Tunga"/>
+        <a:font script="Guru" typeface="Raavi"/>
+        <a:font script="Cans" typeface="Euphemia"/>
+        <a:font script="Cher" typeface="Plantagenet Cherokee"/>
+        <a:font script="Yiii" typeface="Microsoft Yi Baiti"/>
+        <a:font script="Tibt" typeface="Microsoft Himalaya"/>
+        <a:font script="Thaa" typeface="MV Boli"/>
+        <a:font script="Deva" typeface="Mangal"/>
+        <a:font script="Telu" typeface="Gautami"/>
+        <a:font script="Taml" typeface="Latha"/>
+        <a:font script="Syrc" typeface="Estrangelo Edessa"/>
+        <a:font script="Orya" typeface="Kalinga"/>
+        <a:font script="Mlym" typeface="Kartika"/>
+        <a:font script="Laoo" typeface="DokChampa"/>
+        <a:font script="Sinh" typeface="Iskoola Pota"/>
+        <a:font script="Mong" typeface="Mongolian Baiti"/>
+        <a:font script="Viet" typeface="Times New Roman"/>
+        <a:font script="Uigh" typeface="Microsoft Uighur"/>
+        <a:font script="Geor" typeface="Sylfaen"/>
+        <a:font script="Armn" typeface="Arial"/>
+        <a:font script="Bugi" typeface="Leelawadee UI"/>
+        <a:font script="Bopo" typeface="Microsoft JhengHei"/>
+        <a:font script="Java" typeface="Javanese Text"/>
+        <a:font script="Lisu" typeface="Segoe UI"/>
+        <a:font script="Mymr" typeface="Myanmar Text"/>
+        <a:font script="Nkoo" typeface="Ebrima"/>
+        <a:font script="Olck" typeface="Nirmala UI"/>
+        <a:font script="Osma" typeface="Ebrima"/>
+        <a:font script="Phag" typeface="Phagspa"/>
+        <a:font script="Syrn" typeface="Estrangelo Edessa"/>
+        <a:font script="Syrj" typeface="Estrangelo Edessa"/>
+        <a:font script="Syre" typeface="Estrangelo Edessa"/>
+        <a:font script="Sora" typeface="Nirmala UI"/>
+        <a:font script="Tale" typeface="Microsoft Tai Le"/>
+        <a:font script="Talu" typeface="Microsoft New Tai Lue"/>
+        <a:font script="Tfng" typeface="Ebrima"/>
+      </a:majorFont>
+      <a:minorFont>
+        <a:latin typeface="Calibri" panose="020F0502020204030204"/>
+        <a:ea typeface=""/>
+        <a:cs typeface=""/>
+        <a:font script="Jpan" typeface="游ゴシック"/>
+        <a:font script="Hang" typeface="맑은 고딕"/>
+        <a:font script="Hans" typeface="等线"/>
+        <a:font script="Hant" typeface="新細明體"/>
+        <a:font script="Arab" typeface="Arial"/>
+        <a:font script="Hebr" typeface="Arial"/>
+        <a:font script="Thai" typeface="Cordia New"/>
+        <a:font script="Ethi" typeface="Nyala"/>
+        <a:font script="Beng" typeface="Vrinda"/>
+        <a:font script="Gujr" typeface="Shruti"/>
+        <a:font script="Khmr" typeface="DaunPenh"/>
+        <a:font script="Knda" typeface="Tunga"/>
+        <a:font script="Guru" typeface="Raavi"/>
+        <a:font script="Cans" typeface="Euphemia"/>
+        <a:font script="Cher" typeface="Plantagenet Cherokee"/>
+        <a:font script="Yiii" typeface="Microsoft Yi Baiti"/>
+        <a:font script="Tibt" typeface="Microsoft Himalaya"/>
+        <a:font script="Thaa" typeface="MV Boli"/>
+        <a:font script="Deva" typeface="Mangal"/>
+        <a:font script="Telu" typeface="Gautami"/>
+        <a:font script="Taml" typeface="Latha"/>
+        <a:font script="Syrc" typeface="Estrangelo Edessa"/>
+        <a:font script="Orya" typeface="Kalinga"/>
+        <a:font script="Mlym" typeface="Kartika"/>
+        <a:font script="Laoo" typeface="DokChampa"/>
+        <a:font script="Sinh" typeface="Iskoola Pota"/>
+        <a:font script="Mong" typeface="Mongolian Baiti"/>
+        <a:font script="Viet" typeface="Arial"/>
+        <a:font script="Uigh" typeface="Microsoft Uighur"/>
+        <a:font script="Geor" typeface="Sylfaen"/>
+        <a:font script="Armn" typeface="Arial"/>
+        <a:font script="Bugi" typeface="Leelawadee UI"/>
+        <a:font script="Bopo" typeface="Microsoft JhengHei"/>
+        <a:font script="Java" typeface="Javanese Text"/>
+        <a:font script="Lisu" typeface="Segoe UI"/>
+        <a:font script="Mymr" typeface="Myanmar Text"/>
+        <a:font script="Nkoo" typeface="Ebrima"/>
+        <a:font script="Olck" typeface="Nirmala UI"/>
+        <a:font script="Osma" typeface="Ebrima"/>
+        <a:font script="Phag" typeface="Phagspa"/>
+        <a:font script="Syrn" typeface="Estrangelo Edessa"/>
+        <a:font script="Syrj" typeface="Estrangelo Edessa"/>
+        <a:font script="Syre" typeface="Estrangelo Edessa"/>
+        <a:font script="Sora" typeface="Nirmala UI"/>
+        <a:font script="Tale" typeface="Microsoft Tai Le"/>
+        <a:font script="Talu" typeface="Microsoft New Tai Lue"/>
+        <a:font script="Tfng" typeface="Ebrima"/>
+      </a:minorFont>
+    </a:fontScheme>
+    <a:fmtScheme name="Office">
+      <a:fillStyleLst>
+        <a:solidFill>
+          <a:schemeClr val="phClr"/>
+        </a:solidFill>
+        <a:gradFill rotWithShape="1">
+          <a:gsLst>
+            <a:gs pos="0">
+              <a:schemeClr val="phClr">
+                <a:lumMod val="110000"/>
+                <a:satMod val="105000"/>
+                <a:tint val="67000"/>
+              </a:schemeClr>
+            </a:gs>
+            <a:gs pos="50000">
+              <a:schemeClr val="phClr">
+                <a:lumMod val="105000"/>
+                <a:satMod val="103000"/>
+                <a:tint val="73000"/>
+              </a:schemeClr>
+            </a:gs>
+            <a:gs pos="100000">
+              <a:schemeClr val="phClr">
+                <a:lumMod val="105000"/>
+                <a:satMod val="109000"/>
+                <a:tint val="81000"/>
+              </a:schemeClr>
+            </a:gs>
+          </a:gsLst>
+          <a:lin ang="5400000" scaled="0"/>
+        </a:gradFill>
+        <a:gradFill rotWithShape="1">
+          <a:gsLst>
+            <a:gs pos="0">
+              <a:schemeClr val="phClr">
+                <a:satMod val="103000"/>
+                <a:lumMod val="102000"/>
+                <a:tint val="94000"/>
+              </a:schemeClr>
+            </a:gs>
+            <a:gs pos="50000">
+              <a:schemeClr val="phClr">
+                <a:satMod val="110000"/>
+                <a:lumMod val="100000"/>
+                <a:shade val="100000"/>
+              </a:schemeClr>
+            </a:gs>
+            <a:gs pos="100000">
+              <a:schemeClr val="phClr">
+                <a:lumMod val="99000"/>
+                <a:satMod val="120000"/>
+                <a:shade val="78000"/>
+              </a:schemeClr>
+            </a:gs>
+          </a:gsLst>
+          <a:lin ang="5400000" scaled="0"/>
+        </a:gradFill>
+      </a:fillStyleLst>
+      <a:lnStyleLst>
+        <a:ln w="6350" cap="flat" cmpd="sng" algn="ctr">
+          <a:solidFill>
+            <a:schemeClr val="phClr"/>
+          </a:solidFill>
+          <a:prstDash val="solid"/>
+          <a:miter lim="800000"/>
+        </a:ln>
+        <a:ln w="12700" cap="flat" cmpd="sng" algn="ctr">
+          <a:solidFill>
+            <a:schemeClr val="phClr"/>
+          </a:solidFill>
+          <a:prstDash val="solid"/>
+          <a:miter lim="800000"/>
+        </a:ln>
+        <a:ln w="19050" cap="flat" cmpd="sng" algn="ctr">
+          <a:solidFill>
+            <a:schemeClr val="phClr"/>
+          </a:solidFill>
+          <a:prstDash val="solid"/>
+          <a:miter lim="800000"/>
+        </a:ln>
+      </a:lnStyleLst>
+      <a:effectStyleLst>
+        <a:effectStyle>
+          <a:effectLst/>
+        </a:effectStyle>
+        <a:effectStyle>
+          <a:effectLst/>
+        </a:effectStyle>
+        <a:effectStyle>
+          <a:effectLst>
+            <a:outerShdw blurRad="57150" dist="19050" dir="5400000" algn="ctr" rotWithShape="0">
+              <a:srgbClr val="000000">
+                <a:alpha val="63000"/>
+              </a:srgbClr>
+            </a:outerShdw>
+          </a:effectLst>
+        </a:effectStyle>
+      </a:effectStyleLst>
+      <a:bgFillStyleLst>
+        <a:solidFill>
+          <a:schemeClr val="phClr"/>
+        </a:solidFill>
+        <a:solidFill>
+          <a:schemeClr val="phClr">
+            <a:tint val="95000"/>
+            <a:satMod val="170000"/>
+          </a:schemeClr>
+        </a:solidFill>
+        <a:gradFill rotWithShape="1">
+          <a:gsLst>
+            <a:gs pos="0">
+              <a:schemeClr val="phClr">
+                <a:tint val="93000"/>
+                <a:satMod val="150000"/>
+                <a:shade val="98000"/>
+                <a:lumMod val="102000"/>
+              </a:schemeClr>
+            </a:gs>
+            <a:gs pos="50000">
+              <a:schemeClr val="phClr">
+                <a:tint val="98000"/>
+                <a:satMod val="130000"/>
+                <a:shade val="90000"/>
+                <a:lumMod val="103000"/>
+              </a:schemeClr>
+            </a:gs>
+            <a:gs pos="100000">
+              <a:schemeClr val="phClr">
+                <a:shade val="63000"/>
+                <a:satMod val="120000"/>
+              </a:schemeClr>
+            </a:gs>
+          </a:gsLst>
+          <a:lin ang="5400000" scaled="0"/>
+        </a:gradFill>
+      </a:bgFillStyleLst>
+    </a:fmtScheme>
+  </a:themeElements>
+  <a:objectDefaults/>
+  <a:extraClrSchemeLst/>
+  <a:extLst>
+    <a:ext uri="{05A4C25C-085E-4340-85A3-A5531E510DB2}">
+      <thm15:themeFamily xmlns:thm15="http://schemas.microsoft.com/office/thememl/2012/main" name="Office Theme" id="{62F939B6-93AF-4DB8-9C6B-D6C7DFDC589F}" vid="{4A3C46E8-61CC-4603-A589-7422A47A8E4A}"/>
+    </a:ext>
+  </a:extLst>
+</a:theme>
 </file>
</xml_diff>